<commit_message>
added etl for all of our data (wip)
</commit_message>
<xml_diff>
--- a/presentation/presentation.pptx
+++ b/presentation/presentation.pptx
@@ -105,6 +105,11 @@
       </a:defRPr>
     </a:lvl9pPr>
   </p:defaultTextStyle>
+  <p:extLst>
+    <p:ext uri="{EFAFB233-063F-42B5-8137-9DF3F51BA10A}">
+      <p15:sldGuideLst xmlns:p15="http://schemas.microsoft.com/office/powerpoint/2012/main"/>
+    </p:ext>
+  </p:extLst>
 </p:presentation>
 </file>
 
@@ -255,7 +260,7 @@
           <a:p>
             <a:fld id="{DAA870EF-88EF-4C7C-B4B0-67786D37935B}" type="datetimeFigureOut">
               <a:rPr lang="de-DE" smtClean="0"/>
-              <a:t>05.11.2023</a:t>
+              <a:t>06.11.2023</a:t>
             </a:fld>
             <a:endParaRPr lang="de-DE"/>
           </a:p>
@@ -453,7 +458,7 @@
           <a:p>
             <a:fld id="{DAA870EF-88EF-4C7C-B4B0-67786D37935B}" type="datetimeFigureOut">
               <a:rPr lang="de-DE" smtClean="0"/>
-              <a:t>05.11.2023</a:t>
+              <a:t>06.11.2023</a:t>
             </a:fld>
             <a:endParaRPr lang="de-DE"/>
           </a:p>
@@ -661,7 +666,7 @@
           <a:p>
             <a:fld id="{DAA870EF-88EF-4C7C-B4B0-67786D37935B}" type="datetimeFigureOut">
               <a:rPr lang="de-DE" smtClean="0"/>
-              <a:t>05.11.2023</a:t>
+              <a:t>06.11.2023</a:t>
             </a:fld>
             <a:endParaRPr lang="de-DE"/>
           </a:p>
@@ -859,7 +864,7 @@
           <a:p>
             <a:fld id="{DAA870EF-88EF-4C7C-B4B0-67786D37935B}" type="datetimeFigureOut">
               <a:rPr lang="de-DE" smtClean="0"/>
-              <a:t>05.11.2023</a:t>
+              <a:t>06.11.2023</a:t>
             </a:fld>
             <a:endParaRPr lang="de-DE"/>
           </a:p>
@@ -1134,7 +1139,7 @@
           <a:p>
             <a:fld id="{DAA870EF-88EF-4C7C-B4B0-67786D37935B}" type="datetimeFigureOut">
               <a:rPr lang="de-DE" smtClean="0"/>
-              <a:t>05.11.2023</a:t>
+              <a:t>06.11.2023</a:t>
             </a:fld>
             <a:endParaRPr lang="de-DE"/>
           </a:p>
@@ -1399,7 +1404,7 @@
           <a:p>
             <a:fld id="{DAA870EF-88EF-4C7C-B4B0-67786D37935B}" type="datetimeFigureOut">
               <a:rPr lang="de-DE" smtClean="0"/>
-              <a:t>05.11.2023</a:t>
+              <a:t>06.11.2023</a:t>
             </a:fld>
             <a:endParaRPr lang="de-DE"/>
           </a:p>
@@ -1811,7 +1816,7 @@
           <a:p>
             <a:fld id="{DAA870EF-88EF-4C7C-B4B0-67786D37935B}" type="datetimeFigureOut">
               <a:rPr lang="de-DE" smtClean="0"/>
-              <a:t>05.11.2023</a:t>
+              <a:t>06.11.2023</a:t>
             </a:fld>
             <a:endParaRPr lang="de-DE"/>
           </a:p>
@@ -1952,7 +1957,7 @@
           <a:p>
             <a:fld id="{DAA870EF-88EF-4C7C-B4B0-67786D37935B}" type="datetimeFigureOut">
               <a:rPr lang="de-DE" smtClean="0"/>
-              <a:t>05.11.2023</a:t>
+              <a:t>06.11.2023</a:t>
             </a:fld>
             <a:endParaRPr lang="de-DE"/>
           </a:p>
@@ -2065,7 +2070,7 @@
           <a:p>
             <a:fld id="{DAA870EF-88EF-4C7C-B4B0-67786D37935B}" type="datetimeFigureOut">
               <a:rPr lang="de-DE" smtClean="0"/>
-              <a:t>05.11.2023</a:t>
+              <a:t>06.11.2023</a:t>
             </a:fld>
             <a:endParaRPr lang="de-DE"/>
           </a:p>
@@ -2376,7 +2381,7 @@
           <a:p>
             <a:fld id="{DAA870EF-88EF-4C7C-B4B0-67786D37935B}" type="datetimeFigureOut">
               <a:rPr lang="de-DE" smtClean="0"/>
-              <a:t>05.11.2023</a:t>
+              <a:t>06.11.2023</a:t>
             </a:fld>
             <a:endParaRPr lang="de-DE"/>
           </a:p>
@@ -2664,7 +2669,7 @@
           <a:p>
             <a:fld id="{DAA870EF-88EF-4C7C-B4B0-67786D37935B}" type="datetimeFigureOut">
               <a:rPr lang="de-DE" smtClean="0"/>
-              <a:t>05.11.2023</a:t>
+              <a:t>06.11.2023</a:t>
             </a:fld>
             <a:endParaRPr lang="de-DE"/>
           </a:p>
@@ -2905,7 +2910,7 @@
           <a:p>
             <a:fld id="{DAA870EF-88EF-4C7C-B4B0-67786D37935B}" type="datetimeFigureOut">
               <a:rPr lang="de-DE" smtClean="0"/>
-              <a:t>05.11.2023</a:t>
+              <a:t>06.11.2023</a:t>
             </a:fld>
             <a:endParaRPr lang="de-DE"/>
           </a:p>
@@ -5426,11 +5431,17 @@
             </a:extLst>
           </p:cNvPr>
           <p:cNvGraphicFramePr/>
-          <p:nvPr/>
+          <p:nvPr>
+            <p:extLst>
+              <p:ext uri="{D42A27DB-BD31-4B8C-83A1-F6EECF244321}">
+                <p14:modId xmlns:p14="http://schemas.microsoft.com/office/powerpoint/2010/main" val="1866400018"/>
+              </p:ext>
+            </p:extLst>
+          </p:nvPr>
         </p:nvGraphicFramePr>
         <p:xfrm>
-          <a:off x="796204" y="1487309"/>
-          <a:ext cx="1752998" cy="733320"/>
+          <a:off x="795095" y="1304429"/>
+          <a:ext cx="1752998" cy="916200"/>
         </p:xfrm>
         <a:graphic>
           <a:graphicData uri="http://schemas.openxmlformats.org/drawingml/2006/table">
@@ -5540,9 +5551,34 @@
                         </a:rPr>
                         <a:t>PLAYER_NAME</a:t>
                       </a:r>
-                      <a:endParaRPr lang="de-DE" sz="1200" b="0" strike="noStrike" spc="-1" dirty="0">
-                        <a:latin typeface="Calibri"/>
-                      </a:endParaRPr>
+                    </a:p>
+                    <a:p>
+                      <a:pPr marL="0" marR="0" lvl="0" indent="0" algn="l" defTabSz="914400" rtl="0" eaLnBrk="1" fontAlgn="auto" latinLnBrk="0" hangingPunct="1">
+                        <a:lnSpc>
+                          <a:spcPct val="100000"/>
+                        </a:lnSpc>
+                        <a:spcBef>
+                          <a:spcPts val="0"/>
+                        </a:spcBef>
+                        <a:spcAft>
+                          <a:spcPts val="0"/>
+                        </a:spcAft>
+                        <a:buClrTx/>
+                        <a:buSzTx/>
+                        <a:buFontTx/>
+                        <a:buNone/>
+                        <a:tabLst/>
+                        <a:defRPr/>
+                      </a:pPr>
+                      <a:r>
+                        <a:rPr lang="en-GB" sz="1200" b="0" strike="noStrike" spc="-1" dirty="0">
+                          <a:solidFill>
+                            <a:srgbClr val="000000"/>
+                          </a:solidFill>
+                          <a:latin typeface="Century Gothic"/>
+                        </a:rPr>
+                        <a:t>SHIRT_NUMBER</a:t>
+                      </a:r>
                     </a:p>
                   </a:txBody>
                   <a:tcPr>
@@ -5598,11 +5634,17 @@
             </a:extLst>
           </p:cNvPr>
           <p:cNvGraphicFramePr/>
-          <p:nvPr/>
+          <p:nvPr>
+            <p:extLst>
+              <p:ext uri="{D42A27DB-BD31-4B8C-83A1-F6EECF244321}">
+                <p14:modId xmlns:p14="http://schemas.microsoft.com/office/powerpoint/2010/main" val="764248705"/>
+              </p:ext>
+            </p:extLst>
+          </p:nvPr>
         </p:nvGraphicFramePr>
         <p:xfrm>
           <a:off x="2996085" y="3429000"/>
-          <a:ext cx="1522440" cy="1463040"/>
+          <a:ext cx="1522440" cy="1645920"/>
         </p:xfrm>
         <a:graphic>
           <a:graphicData uri="http://schemas.openxmlformats.org/drawingml/2006/table">
@@ -5763,6 +5805,22 @@
                         </a:rPr>
                         <a:t>LOCATION_ID</a:t>
                       </a:r>
+                    </a:p>
+                    <a:p>
+                      <a:pPr>
+                        <a:lnSpc>
+                          <a:spcPct val="100000"/>
+                        </a:lnSpc>
+                      </a:pPr>
+                      <a:r>
+                        <a:rPr lang="en-GB" sz="1200" b="0" strike="noStrike" spc="-1" dirty="0">
+                          <a:solidFill>
+                            <a:srgbClr val="000000"/>
+                          </a:solidFill>
+                          <a:latin typeface="Century Gothic"/>
+                        </a:rPr>
+                        <a:t>TEAM_ID</a:t>
+                      </a:r>
                       <a:endParaRPr lang="de-DE" sz="1200" b="0" strike="noStrike" spc="-1" dirty="0">
                         <a:latin typeface="Calibri"/>
                       </a:endParaRPr>
@@ -5821,11 +5879,17 @@
             </a:extLst>
           </p:cNvPr>
           <p:cNvGraphicFramePr/>
-          <p:nvPr/>
+          <p:nvPr>
+            <p:extLst>
+              <p:ext uri="{D42A27DB-BD31-4B8C-83A1-F6EECF244321}">
+                <p14:modId xmlns:p14="http://schemas.microsoft.com/office/powerpoint/2010/main" val="3007208408"/>
+              </p:ext>
+            </p:extLst>
+          </p:nvPr>
         </p:nvGraphicFramePr>
         <p:xfrm>
           <a:off x="795095" y="4034439"/>
-          <a:ext cx="1752999" cy="1281960"/>
+          <a:ext cx="1752999" cy="1099080"/>
         </p:xfrm>
         <a:graphic>
           <a:graphicData uri="http://schemas.openxmlformats.org/drawingml/2006/table">
@@ -5933,7 +5997,7 @@
                           </a:solidFill>
                           <a:latin typeface="Century Gothic"/>
                         </a:rPr>
-                        <a:t>SHIRT_NUMBER</a:t>
+                        <a:t>GOALS</a:t>
                       </a:r>
                     </a:p>
                     <a:p>
@@ -5949,23 +6013,7 @@
                           </a:solidFill>
                           <a:latin typeface="Century Gothic"/>
                         </a:rPr>
-                        <a:t>PLAYER_GOALS</a:t>
-                      </a:r>
-                    </a:p>
-                    <a:p>
-                      <a:pPr>
-                        <a:lnSpc>
-                          <a:spcPct val="100000"/>
-                        </a:lnSpc>
-                      </a:pPr>
-                      <a:r>
-                        <a:rPr lang="en-GB" sz="1200" b="0" strike="noStrike" spc="-1" dirty="0">
-                          <a:solidFill>
-                            <a:srgbClr val="000000"/>
-                          </a:solidFill>
-                          <a:latin typeface="Century Gothic"/>
-                        </a:rPr>
-                        <a:t>PLAYER_RED_CARDS</a:t>
+                        <a:t>RED_CARDS</a:t>
                       </a:r>
                       <a:endParaRPr lang="de-DE" sz="1200" b="0" strike="noStrike" spc="-1" dirty="0">
                         <a:solidFill>
@@ -5987,14 +6035,8 @@
                           </a:solidFill>
                           <a:latin typeface="Calibri"/>
                         </a:rPr>
-                        <a:t>PLAYER_YELLOW_CARDS</a:t>
+                        <a:t>YELLOW_CARDS</a:t>
                       </a:r>
-                      <a:endParaRPr lang="en-GB" sz="1200" b="0" strike="noStrike" spc="-1" dirty="0">
-                        <a:solidFill>
-                          <a:srgbClr val="000000"/>
-                        </a:solidFill>
-                        <a:latin typeface="Century Gothic"/>
-                      </a:endParaRPr>
                     </a:p>
                   </a:txBody>
                   <a:tcPr>
@@ -6050,10 +6092,16 @@
             </a:extLst>
           </p:cNvPr>
           <p:cNvGraphicFramePr/>
-          <p:nvPr/>
+          <p:nvPr>
+            <p:extLst>
+              <p:ext uri="{D42A27DB-BD31-4B8C-83A1-F6EECF244321}">
+                <p14:modId xmlns:p14="http://schemas.microsoft.com/office/powerpoint/2010/main" val="1417588253"/>
+              </p:ext>
+            </p:extLst>
+          </p:nvPr>
         </p:nvGraphicFramePr>
         <p:xfrm>
-          <a:off x="795095" y="5485902"/>
+          <a:off x="795095" y="5308004"/>
           <a:ext cx="1752998" cy="916200"/>
         </p:xfrm>
         <a:graphic>
@@ -6535,8 +6583,8 @@
         </p:nvCxnSpPr>
         <p:spPr>
           <a:xfrm flipH="1" flipV="1">
-            <a:off x="4518525" y="4160520"/>
-            <a:ext cx="450496" cy="971199"/>
+            <a:off x="4518525" y="4251960"/>
+            <a:ext cx="450496" cy="879759"/>
           </a:xfrm>
           <a:prstGeom prst="line">
             <a:avLst/>
@@ -6582,8 +6630,8 @@
         </p:nvCxnSpPr>
         <p:spPr>
           <a:xfrm>
-            <a:off x="2549202" y="1853969"/>
-            <a:ext cx="446883" cy="2306551"/>
+            <a:off x="2548093" y="1762529"/>
+            <a:ext cx="447992" cy="2489431"/>
           </a:xfrm>
           <a:prstGeom prst="line">
             <a:avLst/>
@@ -6630,7 +6678,7 @@
         <p:spPr>
           <a:xfrm>
             <a:off x="2548093" y="3127534"/>
-            <a:ext cx="447992" cy="1032986"/>
+            <a:ext cx="447992" cy="1124426"/>
           </a:xfrm>
           <a:prstGeom prst="line">
             <a:avLst/>
@@ -6675,7 +6723,7 @@
         <p:spPr>
           <a:xfrm flipH="1">
             <a:off x="2548094" y="4160520"/>
-            <a:ext cx="447991" cy="514899"/>
+            <a:ext cx="447991" cy="423459"/>
           </a:xfrm>
           <a:prstGeom prst="line">
             <a:avLst/>
@@ -6721,8 +6769,244 @@
         </p:nvCxnSpPr>
         <p:spPr>
           <a:xfrm flipH="1">
-            <a:off x="2548093" y="4160520"/>
-            <a:ext cx="447992" cy="1783482"/>
+            <a:off x="2548093" y="4251960"/>
+            <a:ext cx="447992" cy="1514144"/>
+          </a:xfrm>
+          <a:prstGeom prst="line">
+            <a:avLst/>
+          </a:prstGeom>
+          <a:ln>
+            <a:solidFill>
+              <a:schemeClr val="accent4">
+                <a:lumMod val="75000"/>
+              </a:schemeClr>
+            </a:solidFill>
+          </a:ln>
+        </p:spPr>
+        <p:style>
+          <a:lnRef idx="1">
+            <a:schemeClr val="accent1"/>
+          </a:lnRef>
+          <a:fillRef idx="0">
+            <a:schemeClr val="accent1"/>
+          </a:fillRef>
+          <a:effectRef idx="0">
+            <a:schemeClr val="accent1"/>
+          </a:effectRef>
+          <a:fontRef idx="minor">
+            <a:schemeClr val="tx1"/>
+          </a:fontRef>
+        </p:style>
+      </p:cxnSp>
+      <p:graphicFrame>
+        <p:nvGraphicFramePr>
+          <p:cNvPr id="15" name="Table 10">
+            <a:extLst>
+              <a:ext uri="{FF2B5EF4-FFF2-40B4-BE49-F238E27FC236}">
+                <a16:creationId xmlns:a16="http://schemas.microsoft.com/office/drawing/2014/main" id="{788E99A8-1E9C-2576-30B5-617E4DE6BD74}"/>
+              </a:ext>
+            </a:extLst>
+          </p:cNvPr>
+          <p:cNvGraphicFramePr/>
+          <p:nvPr>
+            <p:extLst>
+              <p:ext uri="{D42A27DB-BD31-4B8C-83A1-F6EECF244321}">
+                <p14:modId xmlns:p14="http://schemas.microsoft.com/office/powerpoint/2010/main" val="1353004887"/>
+              </p:ext>
+            </p:extLst>
+          </p:nvPr>
+        </p:nvGraphicFramePr>
+        <p:xfrm>
+          <a:off x="2996085" y="2074031"/>
+          <a:ext cx="1522440" cy="916200"/>
+        </p:xfrm>
+        <a:graphic>
+          <a:graphicData uri="http://schemas.openxmlformats.org/drawingml/2006/table">
+            <a:tbl>
+              <a:tblPr/>
+              <a:tblGrid>
+                <a:gridCol w="1522440">
+                  <a:extLst>
+                    <a:ext uri="{9D8B030D-6E8A-4147-A177-3AD203B41FA5}">
+                      <a16:colId xmlns:a16="http://schemas.microsoft.com/office/drawing/2014/main" val="20000"/>
+                    </a:ext>
+                  </a:extLst>
+                </a:gridCol>
+              </a:tblGrid>
+              <a:tr h="276120">
+                <a:tc>
+                  <a:txBody>
+                    <a:bodyPr/>
+                    <a:lstStyle/>
+                    <a:p>
+                      <a:pPr>
+                        <a:lnSpc>
+                          <a:spcPct val="100000"/>
+                        </a:lnSpc>
+                      </a:pPr>
+                      <a:r>
+                        <a:rPr lang="en-GB" sz="1200" b="1" strike="noStrike" spc="-1" dirty="0">
+                          <a:solidFill>
+                            <a:srgbClr val="FFFFFF"/>
+                          </a:solidFill>
+                          <a:latin typeface="Century Gothic"/>
+                        </a:rPr>
+                        <a:t>TEAMDIM</a:t>
+                      </a:r>
+                      <a:endParaRPr lang="de-DE" sz="1200" b="0" strike="noStrike" spc="-1" dirty="0">
+                        <a:latin typeface="Calibri"/>
+                      </a:endParaRPr>
+                    </a:p>
+                  </a:txBody>
+                  <a:tcPr>
+                    <a:lnL w="12240">
+                      <a:solidFill>
+                        <a:srgbClr val="FFFFFF"/>
+                      </a:solidFill>
+                    </a:lnL>
+                    <a:lnR w="12240">
+                      <a:solidFill>
+                        <a:srgbClr val="FFFFFF"/>
+                      </a:solidFill>
+                    </a:lnR>
+                    <a:lnT w="12240">
+                      <a:solidFill>
+                        <a:srgbClr val="FFFFFF"/>
+                      </a:solidFill>
+                    </a:lnT>
+                    <a:lnB w="38160">
+                      <a:solidFill>
+                        <a:srgbClr val="FFFFFF"/>
+                      </a:solidFill>
+                    </a:lnB>
+                    <a:solidFill>
+                      <a:schemeClr val="accent4">
+                        <a:lumMod val="75000"/>
+                      </a:schemeClr>
+                    </a:solidFill>
+                  </a:tcPr>
+                </a:tc>
+                <a:extLst>
+                  <a:ext uri="{0D108BD9-81ED-4DB2-BD59-A6C34878D82A}">
+                    <a16:rowId xmlns:a16="http://schemas.microsoft.com/office/drawing/2014/main" val="10000"/>
+                  </a:ext>
+                </a:extLst>
+              </a:tr>
+              <a:tr h="370800">
+                <a:tc>
+                  <a:txBody>
+                    <a:bodyPr/>
+                    <a:lstStyle/>
+                    <a:p>
+                      <a:pPr>
+                        <a:lnSpc>
+                          <a:spcPct val="100000"/>
+                        </a:lnSpc>
+                      </a:pPr>
+                      <a:r>
+                        <a:rPr lang="de-DE" sz="1200" b="0" strike="noStrike" spc="-1" dirty="0">
+                          <a:solidFill>
+                            <a:srgbClr val="000000"/>
+                          </a:solidFill>
+                          <a:latin typeface="Century Gothic"/>
+                        </a:rPr>
+                        <a:t>ID</a:t>
+                      </a:r>
+                    </a:p>
+                    <a:p>
+                      <a:pPr>
+                        <a:lnSpc>
+                          <a:spcPct val="100000"/>
+                        </a:lnSpc>
+                      </a:pPr>
+                      <a:r>
+                        <a:rPr lang="de-DE" sz="1200" b="0" strike="noStrike" spc="-1" dirty="0">
+                          <a:solidFill>
+                            <a:srgbClr val="000000"/>
+                          </a:solidFill>
+                          <a:latin typeface="Century Gothic"/>
+                        </a:rPr>
+                        <a:t>TEAM_NAME</a:t>
+                      </a:r>
+                    </a:p>
+                    <a:p>
+                      <a:pPr>
+                        <a:lnSpc>
+                          <a:spcPct val="100000"/>
+                        </a:lnSpc>
+                      </a:pPr>
+                      <a:r>
+                        <a:rPr lang="de-DE" sz="1200" b="0" strike="noStrike" spc="-1" dirty="0">
+                          <a:solidFill>
+                            <a:srgbClr val="000000"/>
+                          </a:solidFill>
+                          <a:latin typeface="Century Gothic"/>
+                        </a:rPr>
+                        <a:t>RANK</a:t>
+                      </a:r>
+                    </a:p>
+                  </a:txBody>
+                  <a:tcPr>
+                    <a:lnL w="12240">
+                      <a:solidFill>
+                        <a:srgbClr val="FFFFFF"/>
+                      </a:solidFill>
+                    </a:lnL>
+                    <a:lnR w="12240">
+                      <a:solidFill>
+                        <a:srgbClr val="FFFFFF"/>
+                      </a:solidFill>
+                    </a:lnR>
+                    <a:lnT w="38160" cap="flat" cmpd="sng" algn="ctr">
+                      <a:solidFill>
+                        <a:srgbClr val="FFFFFF"/>
+                      </a:solidFill>
+                      <a:prstDash val="solid"/>
+                      <a:round/>
+                      <a:headEnd type="none" w="med" len="med"/>
+                      <a:tailEnd type="none" w="med" len="med"/>
+                    </a:lnT>
+                    <a:lnB w="12240">
+                      <a:solidFill>
+                        <a:srgbClr val="FFFFFF"/>
+                      </a:solidFill>
+                    </a:lnB>
+                    <a:solidFill>
+                      <a:schemeClr val="accent4">
+                        <a:lumMod val="40000"/>
+                        <a:lumOff val="60000"/>
+                      </a:schemeClr>
+                    </a:solidFill>
+                  </a:tcPr>
+                </a:tc>
+                <a:extLst>
+                  <a:ext uri="{0D108BD9-81ED-4DB2-BD59-A6C34878D82A}">
+                    <a16:rowId xmlns:a16="http://schemas.microsoft.com/office/drawing/2014/main" val="10001"/>
+                  </a:ext>
+                </a:extLst>
+              </a:tr>
+            </a:tbl>
+          </a:graphicData>
+        </a:graphic>
+      </p:graphicFrame>
+      <p:cxnSp>
+        <p:nvCxnSpPr>
+          <p:cNvPr id="18" name="Gerader Verbinder 17">
+            <a:extLst>
+              <a:ext uri="{FF2B5EF4-FFF2-40B4-BE49-F238E27FC236}">
+                <a16:creationId xmlns:a16="http://schemas.microsoft.com/office/drawing/2014/main" id="{191FC551-BB42-4065-0EDB-A3AECA551EAE}"/>
+              </a:ext>
+            </a:extLst>
+          </p:cNvPr>
+          <p:cNvCxnSpPr>
+            <a:endCxn id="4" idx="0"/>
+          </p:cNvCxnSpPr>
+          <p:nvPr/>
+        </p:nvCxnSpPr>
+        <p:spPr>
+          <a:xfrm>
+            <a:off x="3757305" y="2961524"/>
+            <a:ext cx="0" cy="467476"/>
           </a:xfrm>
           <a:prstGeom prst="line">
             <a:avLst/>

</xml_diff>